<commit_message>
Iluminacion de los objetos andando
</commit_message>
<xml_diff>
--- a/El museo del éxito.pptx
+++ b/El museo del éxito.pptx
@@ -4958,6 +4958,225 @@
           </a:p>
         </p:txBody>
       </p:sp>
+      <p:sp>
+        <p:nvSpPr>
+          <p:cNvPr id="2" name="Rectángulo 1"/>
+          <p:cNvSpPr/>
+          <p:nvPr/>
+        </p:nvSpPr>
+        <p:spPr>
+          <a:xfrm>
+            <a:off x="818605" y="1776549"/>
+            <a:ext cx="10580915" cy="4662815"/>
+          </a:xfrm>
+          <a:prstGeom prst="rect">
+            <a:avLst/>
+          </a:prstGeom>
+        </p:spPr>
+        <p:txBody>
+          <a:bodyPr wrap="square">
+            <a:spAutoFit/>
+          </a:bodyPr>
+          <a:lstStyle/>
+          <a:p>
+            <a:r>
+              <a:rPr lang="es-AR" sz="3300" dirty="0">
+                <a:solidFill>
+                  <a:schemeClr val="accent4">
+                    <a:lumMod val="40000"/>
+                    <a:lumOff val="60000"/>
+                  </a:schemeClr>
+                </a:solidFill>
+                <a:latin typeface="Times New Roman" panose="02020603050405020304" pitchFamily="18" charset="0"/>
+                <a:cs typeface="Times New Roman" panose="02020603050405020304" pitchFamily="18" charset="0"/>
+              </a:rPr>
+              <a:t>Se define una clase genérica Camera que recibe el </a:t>
+            </a:r>
+            <a:r>
+              <a:rPr lang="es-AR" sz="3300" dirty="0" err="1">
+                <a:solidFill>
+                  <a:schemeClr val="accent4">
+                    <a:lumMod val="40000"/>
+                    <a:lumOff val="60000"/>
+                  </a:schemeClr>
+                </a:solidFill>
+                <a:latin typeface="Times New Roman" panose="02020603050405020304" pitchFamily="18" charset="0"/>
+                <a:cs typeface="Times New Roman" panose="02020603050405020304" pitchFamily="18" charset="0"/>
+              </a:rPr>
+              <a:t>fovy</a:t>
+            </a:r>
+            <a:r>
+              <a:rPr lang="es-AR" sz="3300" dirty="0">
+                <a:solidFill>
+                  <a:schemeClr val="accent4">
+                    <a:lumMod val="40000"/>
+                    <a:lumOff val="60000"/>
+                  </a:schemeClr>
+                </a:solidFill>
+                <a:latin typeface="Times New Roman" panose="02020603050405020304" pitchFamily="18" charset="0"/>
+                <a:cs typeface="Times New Roman" panose="02020603050405020304" pitchFamily="18" charset="0"/>
+              </a:rPr>
+              <a:t> y el </a:t>
+            </a:r>
+            <a:r>
+              <a:rPr lang="es-AR" sz="3300" dirty="0" err="1">
+                <a:solidFill>
+                  <a:schemeClr val="accent4">
+                    <a:lumMod val="40000"/>
+                    <a:lumOff val="60000"/>
+                  </a:schemeClr>
+                </a:solidFill>
+                <a:latin typeface="Times New Roman" panose="02020603050405020304" pitchFamily="18" charset="0"/>
+                <a:cs typeface="Times New Roman" panose="02020603050405020304" pitchFamily="18" charset="0"/>
+              </a:rPr>
+              <a:t>aspect</a:t>
+            </a:r>
+            <a:r>
+              <a:rPr lang="es-AR" sz="3300" dirty="0">
+                <a:solidFill>
+                  <a:schemeClr val="accent4">
+                    <a:lumMod val="40000"/>
+                    <a:lumOff val="60000"/>
+                  </a:schemeClr>
+                </a:solidFill>
+                <a:latin typeface="Times New Roman" panose="02020603050405020304" pitchFamily="18" charset="0"/>
+                <a:cs typeface="Times New Roman" panose="02020603050405020304" pitchFamily="18" charset="0"/>
+              </a:rPr>
+              <a:t> e inicializa dichas propiedades. A su vez fija los valores de </a:t>
+            </a:r>
+            <a:r>
+              <a:rPr lang="es-AR" sz="3300" dirty="0" err="1">
+                <a:solidFill>
+                  <a:schemeClr val="accent4">
+                    <a:lumMod val="40000"/>
+                    <a:lumOff val="60000"/>
+                  </a:schemeClr>
+                </a:solidFill>
+                <a:latin typeface="Times New Roman" panose="02020603050405020304" pitchFamily="18" charset="0"/>
+                <a:cs typeface="Times New Roman" panose="02020603050405020304" pitchFamily="18" charset="0"/>
+              </a:rPr>
+              <a:t>near</a:t>
+            </a:r>
+            <a:r>
+              <a:rPr lang="es-AR" sz="3300" dirty="0">
+                <a:solidFill>
+                  <a:schemeClr val="accent4">
+                    <a:lumMod val="40000"/>
+                    <a:lumOff val="60000"/>
+                  </a:schemeClr>
+                </a:solidFill>
+                <a:latin typeface="Times New Roman" panose="02020603050405020304" pitchFamily="18" charset="0"/>
+                <a:cs typeface="Times New Roman" panose="02020603050405020304" pitchFamily="18" charset="0"/>
+              </a:rPr>
+              <a:t> y </a:t>
+            </a:r>
+            <a:r>
+              <a:rPr lang="es-AR" sz="3300" dirty="0" err="1">
+                <a:solidFill>
+                  <a:schemeClr val="accent4">
+                    <a:lumMod val="40000"/>
+                    <a:lumOff val="60000"/>
+                  </a:schemeClr>
+                </a:solidFill>
+                <a:latin typeface="Times New Roman" panose="02020603050405020304" pitchFamily="18" charset="0"/>
+                <a:cs typeface="Times New Roman" panose="02020603050405020304" pitchFamily="18" charset="0"/>
+              </a:rPr>
+              <a:t>far</a:t>
+            </a:r>
+            <a:r>
+              <a:rPr lang="es-AR" sz="3300" dirty="0">
+                <a:solidFill>
+                  <a:schemeClr val="accent4">
+                    <a:lumMod val="40000"/>
+                    <a:lumOff val="60000"/>
+                  </a:schemeClr>
+                </a:solidFill>
+                <a:latin typeface="Times New Roman" panose="02020603050405020304" pitchFamily="18" charset="0"/>
+                <a:cs typeface="Times New Roman" panose="02020603050405020304" pitchFamily="18" charset="0"/>
+              </a:rPr>
+              <a:t>, e inicializa las matrices de proyección y de </a:t>
+            </a:r>
+            <a:r>
+              <a:rPr lang="es-AR" sz="3300" dirty="0" err="1">
+                <a:solidFill>
+                  <a:schemeClr val="accent4">
+                    <a:lumMod val="40000"/>
+                    <a:lumOff val="60000"/>
+                  </a:schemeClr>
+                </a:solidFill>
+                <a:latin typeface="Times New Roman" panose="02020603050405020304" pitchFamily="18" charset="0"/>
+                <a:cs typeface="Times New Roman" panose="02020603050405020304" pitchFamily="18" charset="0"/>
+              </a:rPr>
+              <a:t>vista.Luego</a:t>
+            </a:r>
+            <a:r>
+              <a:rPr lang="es-AR" sz="3300" dirty="0">
+                <a:solidFill>
+                  <a:schemeClr val="accent4">
+                    <a:lumMod val="40000"/>
+                    <a:lumOff val="60000"/>
+                  </a:schemeClr>
+                </a:solidFill>
+                <a:latin typeface="Times New Roman" panose="02020603050405020304" pitchFamily="18" charset="0"/>
+                <a:cs typeface="Times New Roman" panose="02020603050405020304" pitchFamily="18" charset="0"/>
+              </a:rPr>
+              <a:t> la clase </a:t>
+            </a:r>
+            <a:r>
+              <a:rPr lang="es-AR" sz="3300" dirty="0" err="1">
+                <a:solidFill>
+                  <a:schemeClr val="accent4">
+                    <a:lumMod val="40000"/>
+                    <a:lumOff val="60000"/>
+                  </a:schemeClr>
+                </a:solidFill>
+                <a:latin typeface="Times New Roman" panose="02020603050405020304" pitchFamily="18" charset="0"/>
+                <a:cs typeface="Times New Roman" panose="02020603050405020304" pitchFamily="18" charset="0"/>
+              </a:rPr>
+              <a:t>FreeCamera</a:t>
+            </a:r>
+            <a:r>
+              <a:rPr lang="es-AR" sz="3300" dirty="0">
+                <a:solidFill>
+                  <a:schemeClr val="accent4">
+                    <a:lumMod val="40000"/>
+                    <a:lumOff val="60000"/>
+                  </a:schemeClr>
+                </a:solidFill>
+                <a:latin typeface="Times New Roman" panose="02020603050405020304" pitchFamily="18" charset="0"/>
+                <a:cs typeface="Times New Roman" panose="02020603050405020304" pitchFamily="18" charset="0"/>
+              </a:rPr>
+              <a:t> extiende a Camera implementando el comportamiento específico de la cámara libre. Esta agrega las propiedades de </a:t>
+            </a:r>
+            <a:r>
+              <a:rPr lang="es-AR" sz="3300" dirty="0" err="1">
+                <a:solidFill>
+                  <a:schemeClr val="accent4">
+                    <a:lumMod val="40000"/>
+                    <a:lumOff val="60000"/>
+                  </a:schemeClr>
+                </a:solidFill>
+                <a:latin typeface="Times New Roman" panose="02020603050405020304" pitchFamily="18" charset="0"/>
+                <a:cs typeface="Times New Roman" panose="02020603050405020304" pitchFamily="18" charset="0"/>
+              </a:rPr>
+              <a:t>right</a:t>
+            </a:r>
+            <a:r>
+              <a:rPr lang="es-AR" sz="3300" dirty="0">
+                <a:solidFill>
+                  <a:schemeClr val="accent4">
+                    <a:lumMod val="40000"/>
+                    <a:lumOff val="60000"/>
+                  </a:schemeClr>
+                </a:solidFill>
+                <a:latin typeface="Times New Roman" panose="02020603050405020304" pitchFamily="18" charset="0"/>
+                <a:cs typeface="Times New Roman" panose="02020603050405020304" pitchFamily="18" charset="0"/>
+              </a:rPr>
+              <a:t>, forward y up, siendo este último un valor calculado, además de valores auxiliares como el delta de posición y de rotación, para establecer dichas razones de cambio.</a:t>
+            </a:r>
+          </a:p>
+        </p:txBody>
+      </p:sp>
     </p:spTree>
     <p:extLst>
       <p:ext uri="{BB962C8B-B14F-4D97-AF65-F5344CB8AC3E}">
@@ -4966,7 +5185,7 @@
     </p:extLst>
   </p:cSld>
   <p:clrMapOvr>
-    <a:masterClrMapping/>
+    <a:overrideClrMapping bg1="lt1" tx1="dk1" bg2="lt2" tx2="dk2" accent1="accent1" accent2="accent2" accent3="accent3" accent4="accent4" accent5="accent5" accent6="accent6" hlink="hlink" folHlink="folHlink"/>
   </p:clrMapOvr>
   <p:timing>
     <p:tnLst>
@@ -5067,6 +5286,121 @@
           </a:p>
         </p:txBody>
       </p:sp>
+      <p:sp>
+        <p:nvSpPr>
+          <p:cNvPr id="2" name="Rectángulo 1"/>
+          <p:cNvSpPr/>
+          <p:nvPr/>
+        </p:nvSpPr>
+        <p:spPr>
+          <a:xfrm>
+            <a:off x="1273083" y="2063931"/>
+            <a:ext cx="9901645" cy="3139321"/>
+          </a:xfrm>
+          <a:prstGeom prst="rect">
+            <a:avLst/>
+          </a:prstGeom>
+        </p:spPr>
+        <p:txBody>
+          <a:bodyPr wrap="square">
+            <a:spAutoFit/>
+          </a:bodyPr>
+          <a:lstStyle/>
+          <a:p>
+            <a:r>
+              <a:rPr lang="es-AR" sz="3300" dirty="0">
+                <a:solidFill>
+                  <a:schemeClr val="accent4">
+                    <a:lumMod val="40000"/>
+                    <a:lumOff val="60000"/>
+                  </a:schemeClr>
+                </a:solidFill>
+                <a:latin typeface="Times New Roman" panose="02020603050405020304" pitchFamily="18" charset="0"/>
+                <a:cs typeface="Times New Roman" panose="02020603050405020304" pitchFamily="18" charset="0"/>
+              </a:rPr>
+              <a:t>Luego la clase </a:t>
+            </a:r>
+            <a:r>
+              <a:rPr lang="es-AR" sz="3300" dirty="0" err="1">
+                <a:solidFill>
+                  <a:schemeClr val="accent4">
+                    <a:lumMod val="40000"/>
+                    <a:lumOff val="60000"/>
+                  </a:schemeClr>
+                </a:solidFill>
+                <a:latin typeface="Times New Roman" panose="02020603050405020304" pitchFamily="18" charset="0"/>
+                <a:cs typeface="Times New Roman" panose="02020603050405020304" pitchFamily="18" charset="0"/>
+              </a:rPr>
+              <a:t>FreeCamera</a:t>
+            </a:r>
+            <a:r>
+              <a:rPr lang="es-AR" sz="3300" dirty="0">
+                <a:solidFill>
+                  <a:schemeClr val="accent4">
+                    <a:lumMod val="40000"/>
+                    <a:lumOff val="60000"/>
+                  </a:schemeClr>
+                </a:solidFill>
+                <a:latin typeface="Times New Roman" panose="02020603050405020304" pitchFamily="18" charset="0"/>
+                <a:cs typeface="Times New Roman" panose="02020603050405020304" pitchFamily="18" charset="0"/>
+              </a:rPr>
+              <a:t> extiende a Camera implementando el comportamiento específico de la cámara libre. Esta agrega las propiedades de </a:t>
+            </a:r>
+            <a:r>
+              <a:rPr lang="es-AR" sz="3300" dirty="0" err="1">
+                <a:solidFill>
+                  <a:schemeClr val="accent4">
+                    <a:lumMod val="40000"/>
+                    <a:lumOff val="60000"/>
+                  </a:schemeClr>
+                </a:solidFill>
+                <a:latin typeface="Times New Roman" panose="02020603050405020304" pitchFamily="18" charset="0"/>
+                <a:cs typeface="Times New Roman" panose="02020603050405020304" pitchFamily="18" charset="0"/>
+              </a:rPr>
+              <a:t>eye</a:t>
+            </a:r>
+            <a:r>
+              <a:rPr lang="es-AR" sz="3300" dirty="0">
+                <a:solidFill>
+                  <a:schemeClr val="accent4">
+                    <a:lumMod val="40000"/>
+                    <a:lumOff val="60000"/>
+                  </a:schemeClr>
+                </a:solidFill>
+                <a:latin typeface="Times New Roman" panose="02020603050405020304" pitchFamily="18" charset="0"/>
+                <a:cs typeface="Times New Roman" panose="02020603050405020304" pitchFamily="18" charset="0"/>
+              </a:rPr>
+              <a:t>, </a:t>
+            </a:r>
+            <a:r>
+              <a:rPr lang="es-AR" sz="3300" dirty="0" err="1">
+                <a:solidFill>
+                  <a:schemeClr val="accent4">
+                    <a:lumMod val="40000"/>
+                    <a:lumOff val="60000"/>
+                  </a:schemeClr>
+                </a:solidFill>
+                <a:latin typeface="Times New Roman" panose="02020603050405020304" pitchFamily="18" charset="0"/>
+                <a:cs typeface="Times New Roman" panose="02020603050405020304" pitchFamily="18" charset="0"/>
+              </a:rPr>
+              <a:t>right</a:t>
+            </a:r>
+            <a:r>
+              <a:rPr lang="es-AR" sz="3300" dirty="0">
+                <a:solidFill>
+                  <a:schemeClr val="accent4">
+                    <a:lumMod val="40000"/>
+                    <a:lumOff val="60000"/>
+                  </a:schemeClr>
+                </a:solidFill>
+                <a:latin typeface="Times New Roman" panose="02020603050405020304" pitchFamily="18" charset="0"/>
+                <a:cs typeface="Times New Roman" panose="02020603050405020304" pitchFamily="18" charset="0"/>
+              </a:rPr>
+              <a:t>, forward y up, siendo este último un valor calculado, además de valores auxiliares como el delta de posición y de rotación, para establecer dichas razones de cambio.</a:t>
+            </a:r>
+          </a:p>
+        </p:txBody>
+      </p:sp>
     </p:spTree>
     <p:extLst>
       <p:ext uri="{BB962C8B-B14F-4D97-AF65-F5344CB8AC3E}">
@@ -5075,7 +5409,7 @@
     </p:extLst>
   </p:cSld>
   <p:clrMapOvr>
-    <a:masterClrMapping/>
+    <a:overrideClrMapping bg1="lt1" tx1="dk1" bg2="lt2" tx2="dk2" accent1="accent1" accent2="accent2" accent3="accent3" accent4="accent4" accent5="accent5" accent6="accent6" hlink="hlink" folHlink="folHlink"/>
   </p:clrMapOvr>
   <p:timing>
     <p:tnLst>
@@ -6296,4 +6630,90 @@
     </a:ext>
   </a:extLst>
 </a:theme>
+</file>
+
+<file path=ppt/theme/themeOverride1.xml><?xml version="1.0" encoding="utf-8"?>
+<a:themeOverride xmlns:a="http://schemas.openxmlformats.org/drawingml/2006/main">
+  <a:clrScheme name="Office">
+    <a:dk1>
+      <a:sysClr val="windowText" lastClr="000000"/>
+    </a:dk1>
+    <a:lt1>
+      <a:sysClr val="window" lastClr="FFFFFF"/>
+    </a:lt1>
+    <a:dk2>
+      <a:srgbClr val="44546A"/>
+    </a:dk2>
+    <a:lt2>
+      <a:srgbClr val="E7E6E6"/>
+    </a:lt2>
+    <a:accent1>
+      <a:srgbClr val="5B9BD5"/>
+    </a:accent1>
+    <a:accent2>
+      <a:srgbClr val="ED7D31"/>
+    </a:accent2>
+    <a:accent3>
+      <a:srgbClr val="A5A5A5"/>
+    </a:accent3>
+    <a:accent4>
+      <a:srgbClr val="FFC000"/>
+    </a:accent4>
+    <a:accent5>
+      <a:srgbClr val="4472C4"/>
+    </a:accent5>
+    <a:accent6>
+      <a:srgbClr val="70AD47"/>
+    </a:accent6>
+    <a:hlink>
+      <a:srgbClr val="0563C1"/>
+    </a:hlink>
+    <a:folHlink>
+      <a:srgbClr val="954F72"/>
+    </a:folHlink>
+  </a:clrScheme>
+</a:themeOverride>
+</file>
+
+<file path=ppt/theme/themeOverride2.xml><?xml version="1.0" encoding="utf-8"?>
+<a:themeOverride xmlns:a="http://schemas.openxmlformats.org/drawingml/2006/main">
+  <a:clrScheme name="Office">
+    <a:dk1>
+      <a:sysClr val="windowText" lastClr="000000"/>
+    </a:dk1>
+    <a:lt1>
+      <a:sysClr val="window" lastClr="FFFFFF"/>
+    </a:lt1>
+    <a:dk2>
+      <a:srgbClr val="44546A"/>
+    </a:dk2>
+    <a:lt2>
+      <a:srgbClr val="E7E6E6"/>
+    </a:lt2>
+    <a:accent1>
+      <a:srgbClr val="5B9BD5"/>
+    </a:accent1>
+    <a:accent2>
+      <a:srgbClr val="ED7D31"/>
+    </a:accent2>
+    <a:accent3>
+      <a:srgbClr val="A5A5A5"/>
+    </a:accent3>
+    <a:accent4>
+      <a:srgbClr val="FFC000"/>
+    </a:accent4>
+    <a:accent5>
+      <a:srgbClr val="4472C4"/>
+    </a:accent5>
+    <a:accent6>
+      <a:srgbClr val="70AD47"/>
+    </a:accent6>
+    <a:hlink>
+      <a:srgbClr val="0563C1"/>
+    </a:hlink>
+    <a:folHlink>
+      <a:srgbClr val="954F72"/>
+    </a:folHlink>
+  </a:clrScheme>
+</a:themeOverride>
 </file>
</xml_diff>